<commit_message>
Clarifies the .bib file to use
</commit_message>
<xml_diff>
--- a/StepByStep.pptx
+++ b/StepByStep.pptx
@@ -120,6 +120,11 @@
       </a:defRPr>
     </a:lvl9pPr>
   </p:defaultTextStyle>
+  <p:extLst>
+    <p:ext uri="{EFAFB233-063F-42B5-8137-9DF3F51BA10A}">
+      <p15:sldGuideLst xmlns:p15="http://schemas.microsoft.com/office/powerpoint/2012/main"/>
+    </p:ext>
+  </p:extLst>
 </p:presentation>
 </file>
 
@@ -270,7 +275,7 @@
           <a:p>
             <a:fld id="{100F8F3B-5CE3-487F-A92C-84711F633B83}" type="datetimeFigureOut">
               <a:rPr lang="en-US" smtClean="0"/>
-              <a:t>10/8/2020</a:t>
+              <a:t>10/9/2020</a:t>
             </a:fld>
             <a:endParaRPr lang="en-US"/>
           </a:p>
@@ -468,7 +473,7 @@
           <a:p>
             <a:fld id="{100F8F3B-5CE3-487F-A92C-84711F633B83}" type="datetimeFigureOut">
               <a:rPr lang="en-US" smtClean="0"/>
-              <a:t>10/8/2020</a:t>
+              <a:t>10/9/2020</a:t>
             </a:fld>
             <a:endParaRPr lang="en-US"/>
           </a:p>
@@ -676,7 +681,7 @@
           <a:p>
             <a:fld id="{100F8F3B-5CE3-487F-A92C-84711F633B83}" type="datetimeFigureOut">
               <a:rPr lang="en-US" smtClean="0"/>
-              <a:t>10/8/2020</a:t>
+              <a:t>10/9/2020</a:t>
             </a:fld>
             <a:endParaRPr lang="en-US"/>
           </a:p>
@@ -874,7 +879,7 @@
           <a:p>
             <a:fld id="{100F8F3B-5CE3-487F-A92C-84711F633B83}" type="datetimeFigureOut">
               <a:rPr lang="en-US" smtClean="0"/>
-              <a:t>10/8/2020</a:t>
+              <a:t>10/9/2020</a:t>
             </a:fld>
             <a:endParaRPr lang="en-US"/>
           </a:p>
@@ -1149,7 +1154,7 @@
           <a:p>
             <a:fld id="{100F8F3B-5CE3-487F-A92C-84711F633B83}" type="datetimeFigureOut">
               <a:rPr lang="en-US" smtClean="0"/>
-              <a:t>10/8/2020</a:t>
+              <a:t>10/9/2020</a:t>
             </a:fld>
             <a:endParaRPr lang="en-US"/>
           </a:p>
@@ -1414,7 +1419,7 @@
           <a:p>
             <a:fld id="{100F8F3B-5CE3-487F-A92C-84711F633B83}" type="datetimeFigureOut">
               <a:rPr lang="en-US" smtClean="0"/>
-              <a:t>10/8/2020</a:t>
+              <a:t>10/9/2020</a:t>
             </a:fld>
             <a:endParaRPr lang="en-US"/>
           </a:p>
@@ -1826,7 +1831,7 @@
           <a:p>
             <a:fld id="{100F8F3B-5CE3-487F-A92C-84711F633B83}" type="datetimeFigureOut">
               <a:rPr lang="en-US" smtClean="0"/>
-              <a:t>10/8/2020</a:t>
+              <a:t>10/9/2020</a:t>
             </a:fld>
             <a:endParaRPr lang="en-US"/>
           </a:p>
@@ -1967,7 +1972,7 @@
           <a:p>
             <a:fld id="{100F8F3B-5CE3-487F-A92C-84711F633B83}" type="datetimeFigureOut">
               <a:rPr lang="en-US" smtClean="0"/>
-              <a:t>10/8/2020</a:t>
+              <a:t>10/9/2020</a:t>
             </a:fld>
             <a:endParaRPr lang="en-US"/>
           </a:p>
@@ -2080,7 +2085,7 @@
           <a:p>
             <a:fld id="{100F8F3B-5CE3-487F-A92C-84711F633B83}" type="datetimeFigureOut">
               <a:rPr lang="en-US" smtClean="0"/>
-              <a:t>10/8/2020</a:t>
+              <a:t>10/9/2020</a:t>
             </a:fld>
             <a:endParaRPr lang="en-US"/>
           </a:p>
@@ -2391,7 +2396,7 @@
           <a:p>
             <a:fld id="{100F8F3B-5CE3-487F-A92C-84711F633B83}" type="datetimeFigureOut">
               <a:rPr lang="en-US" smtClean="0"/>
-              <a:t>10/8/2020</a:t>
+              <a:t>10/9/2020</a:t>
             </a:fld>
             <a:endParaRPr lang="en-US"/>
           </a:p>
@@ -2679,7 +2684,7 @@
           <a:p>
             <a:fld id="{100F8F3B-5CE3-487F-A92C-84711F633B83}" type="datetimeFigureOut">
               <a:rPr lang="en-US" smtClean="0"/>
-              <a:t>10/8/2020</a:t>
+              <a:t>10/9/2020</a:t>
             </a:fld>
             <a:endParaRPr lang="en-US"/>
           </a:p>
@@ -2920,7 +2925,7 @@
           <a:p>
             <a:fld id="{100F8F3B-5CE3-487F-A92C-84711F633B83}" type="datetimeFigureOut">
               <a:rPr lang="en-US" smtClean="0"/>
-              <a:t>10/8/2020</a:t>
+              <a:t>10/9/2020</a:t>
             </a:fld>
             <a:endParaRPr lang="en-US"/>
           </a:p>
@@ -3355,12 +3360,22 @@
         </p:nvSpPr>
         <p:spPr/>
         <p:txBody>
-          <a:bodyPr/>
+          <a:bodyPr>
+            <a:normAutofit fontScale="90000"/>
+          </a:bodyPr>
           <a:lstStyle/>
           <a:p>
             <a:r>
               <a:rPr lang="en-US" dirty="0"/>
-              <a:t>Step by step instructions to use the template hosted at</a:t>
+              <a:t>Step by step instructions to use the </a:t>
+            </a:r>
+            <a:r>
+              <a:rPr lang="en-US" dirty="0" err="1"/>
+              <a:t>Rmarkdown</a:t>
+            </a:r>
+            <a:r>
+              <a:rPr lang="en-US" dirty="0"/>
+              <a:t> template hosted at</a:t>
             </a:r>
           </a:p>
         </p:txBody>
@@ -3692,6 +3707,49 @@
           </a:fontRef>
         </p:style>
       </p:cxnSp>
+      <p:sp>
+        <p:nvSpPr>
+          <p:cNvPr id="3" name="TextBox 2">
+            <a:extLst>
+              <a:ext uri="{FF2B5EF4-FFF2-40B4-BE49-F238E27FC236}">
+                <a16:creationId xmlns:a16="http://schemas.microsoft.com/office/drawing/2014/main" id="{FBFDB7A1-EF77-4980-8D79-C1C68C38642A}"/>
+              </a:ext>
+            </a:extLst>
+          </p:cNvPr>
+          <p:cNvSpPr txBox="1"/>
+          <p:nvPr/>
+        </p:nvSpPr>
+        <p:spPr>
+          <a:xfrm>
+            <a:off x="213063" y="1420427"/>
+            <a:ext cx="6764785" cy="369332"/>
+          </a:xfrm>
+          <a:prstGeom prst="rect">
+            <a:avLst/>
+          </a:prstGeom>
+          <a:noFill/>
+        </p:spPr>
+        <p:txBody>
+          <a:bodyPr wrap="square" rtlCol="0">
+            <a:spAutoFit/>
+          </a:bodyPr>
+          <a:lstStyle/>
+          <a:p>
+            <a:r>
+              <a:rPr lang="en-US" dirty="0"/>
+              <a:t>Open the file </a:t>
+            </a:r>
+            <a:r>
+              <a:rPr lang="en-US" dirty="0" err="1"/>
+              <a:t>biblio.bib</a:t>
+            </a:r>
+            <a:r>
+              <a:rPr lang="en-US" dirty="0"/>
+              <a:t> (already has a few example references), then…</a:t>
+            </a:r>
+          </a:p>
+        </p:txBody>
+      </p:sp>
     </p:spTree>
     <p:extLst>
       <p:ext uri="{BB962C8B-B14F-4D97-AF65-F5344CB8AC3E}">
@@ -5094,6 +5152,47 @@
           </a:fontRef>
         </p:style>
       </p:cxnSp>
+      <p:sp>
+        <p:nvSpPr>
+          <p:cNvPr id="6" name="TextBox 5">
+            <a:extLst>
+              <a:ext uri="{FF2B5EF4-FFF2-40B4-BE49-F238E27FC236}">
+                <a16:creationId xmlns:a16="http://schemas.microsoft.com/office/drawing/2014/main" id="{B7C97B67-E593-4A9C-B51E-989DC609C850}"/>
+              </a:ext>
+            </a:extLst>
+          </p:cNvPr>
+          <p:cNvSpPr txBox="1"/>
+          <p:nvPr/>
+        </p:nvSpPr>
+        <p:spPr>
+          <a:xfrm>
+            <a:off x="5478263" y="837965"/>
+            <a:ext cx="6094520" cy="646331"/>
+          </a:xfrm>
+          <a:prstGeom prst="rect">
+            <a:avLst/>
+          </a:prstGeom>
+          <a:noFill/>
+        </p:spPr>
+        <p:txBody>
+          <a:bodyPr wrap="square">
+            <a:spAutoFit/>
+          </a:bodyPr>
+          <a:lstStyle/>
+          <a:p>
+            <a:r>
+              <a:rPr lang="en-US" dirty="0">
+                <a:hlinkClick r:id="rId3"/>
+              </a:rPr>
+              <a:t>https://github.com/TiagoAMarques/RMarkdownTemplate</a:t>
+            </a:r>
+            <a:endParaRPr lang="en-US" dirty="0"/>
+          </a:p>
+          <a:p>
+            <a:endParaRPr lang="en-US" dirty="0"/>
+          </a:p>
+        </p:txBody>
+      </p:sp>
     </p:spTree>
     <p:extLst>
       <p:ext uri="{BB962C8B-B14F-4D97-AF65-F5344CB8AC3E}">
@@ -5404,8 +5503,8 @@
         </p:nvSpPr>
         <p:spPr>
           <a:xfrm>
-            <a:off x="2642586" y="1844055"/>
-            <a:ext cx="6906827" cy="923330"/>
+            <a:off x="1695636" y="1844055"/>
+            <a:ext cx="9099612" cy="646331"/>
           </a:xfrm>
           <a:prstGeom prst="rect">
             <a:avLst/>
@@ -5420,7 +5519,7 @@
           <a:p>
             <a:r>
               <a:rPr lang="en-US" dirty="0"/>
-              <a:t>No screenshot here as the unzipping/extracting depends on your platform. If you do not know how to unzip your file, consider taking using a computer 101 first!</a:t>
+              <a:t>No screenshot here as the unzipping/extracting depends on your platform. If you do not know how to unzip your file, consider taking something like “Using a computer 101” first!</a:t>
             </a:r>
           </a:p>
         </p:txBody>
@@ -5604,6 +5703,308 @@
           </a:fontRef>
         </p:style>
       </p:cxnSp>
+      <p:cxnSp>
+        <p:nvCxnSpPr>
+          <p:cNvPr id="5" name="Straight Arrow Connector 4">
+            <a:extLst>
+              <a:ext uri="{FF2B5EF4-FFF2-40B4-BE49-F238E27FC236}">
+                <a16:creationId xmlns:a16="http://schemas.microsoft.com/office/drawing/2014/main" id="{30C4C5B9-00A2-4FDA-9F57-42EF12C42B9F}"/>
+              </a:ext>
+            </a:extLst>
+          </p:cNvPr>
+          <p:cNvCxnSpPr/>
+          <p:nvPr/>
+        </p:nvCxnSpPr>
+        <p:spPr>
+          <a:xfrm>
+            <a:off x="2521258" y="5903650"/>
+            <a:ext cx="532660" cy="0"/>
+          </a:xfrm>
+          <a:prstGeom prst="straightConnector1">
+            <a:avLst/>
+          </a:prstGeom>
+          <a:ln>
+            <a:tailEnd type="triangle"/>
+          </a:ln>
+        </p:spPr>
+        <p:style>
+          <a:lnRef idx="1">
+            <a:schemeClr val="accent1"/>
+          </a:lnRef>
+          <a:fillRef idx="0">
+            <a:schemeClr val="accent1"/>
+          </a:fillRef>
+          <a:effectRef idx="0">
+            <a:schemeClr val="accent1"/>
+          </a:effectRef>
+          <a:fontRef idx="minor">
+            <a:schemeClr val="tx1"/>
+          </a:fontRef>
+        </p:style>
+      </p:cxnSp>
+      <p:sp>
+        <p:nvSpPr>
+          <p:cNvPr id="7" name="TextBox 6">
+            <a:extLst>
+              <a:ext uri="{FF2B5EF4-FFF2-40B4-BE49-F238E27FC236}">
+                <a16:creationId xmlns:a16="http://schemas.microsoft.com/office/drawing/2014/main" id="{B153B5FB-C7BC-4B75-A635-188E14E90B72}"/>
+              </a:ext>
+            </a:extLst>
+          </p:cNvPr>
+          <p:cNvSpPr txBox="1"/>
+          <p:nvPr/>
+        </p:nvSpPr>
+        <p:spPr>
+          <a:xfrm>
+            <a:off x="3053918" y="5765150"/>
+            <a:ext cx="1642369" cy="276999"/>
+          </a:xfrm>
+          <a:prstGeom prst="rect">
+            <a:avLst/>
+          </a:prstGeom>
+          <a:noFill/>
+        </p:spPr>
+        <p:txBody>
+          <a:bodyPr wrap="square" rtlCol="0">
+            <a:spAutoFit/>
+          </a:bodyPr>
+          <a:lstStyle/>
+          <a:p>
+            <a:r>
+              <a:rPr lang="en-US" sz="1200" dirty="0"/>
+              <a:t>This pptx file</a:t>
+            </a:r>
+          </a:p>
+        </p:txBody>
+      </p:sp>
+      <p:cxnSp>
+        <p:nvCxnSpPr>
+          <p:cNvPr id="9" name="Straight Arrow Connector 8">
+            <a:extLst>
+              <a:ext uri="{FF2B5EF4-FFF2-40B4-BE49-F238E27FC236}">
+                <a16:creationId xmlns:a16="http://schemas.microsoft.com/office/drawing/2014/main" id="{C14C83C7-F4B5-4527-8CB0-BB4C57D4BEA3}"/>
+              </a:ext>
+            </a:extLst>
+          </p:cNvPr>
+          <p:cNvCxnSpPr>
+            <a:cxnSpLocks/>
+          </p:cNvCxnSpPr>
+          <p:nvPr/>
+        </p:nvCxnSpPr>
+        <p:spPr>
+          <a:xfrm>
+            <a:off x="2220897" y="4298271"/>
+            <a:ext cx="532660" cy="0"/>
+          </a:xfrm>
+          <a:prstGeom prst="straightConnector1">
+            <a:avLst/>
+          </a:prstGeom>
+          <a:ln>
+            <a:tailEnd type="triangle"/>
+          </a:ln>
+        </p:spPr>
+        <p:style>
+          <a:lnRef idx="1">
+            <a:schemeClr val="accent1"/>
+          </a:lnRef>
+          <a:fillRef idx="0">
+            <a:schemeClr val="accent1"/>
+          </a:fillRef>
+          <a:effectRef idx="0">
+            <a:schemeClr val="accent1"/>
+          </a:effectRef>
+          <a:fontRef idx="minor">
+            <a:schemeClr val="tx1"/>
+          </a:fontRef>
+        </p:style>
+      </p:cxnSp>
+      <p:sp>
+        <p:nvSpPr>
+          <p:cNvPr id="11" name="TextBox 10">
+            <a:extLst>
+              <a:ext uri="{FF2B5EF4-FFF2-40B4-BE49-F238E27FC236}">
+                <a16:creationId xmlns:a16="http://schemas.microsoft.com/office/drawing/2014/main" id="{4D783064-A3EC-4466-AFA7-43BAD2983886}"/>
+              </a:ext>
+            </a:extLst>
+          </p:cNvPr>
+          <p:cNvSpPr txBox="1"/>
+          <p:nvPr/>
+        </p:nvSpPr>
+        <p:spPr>
+          <a:xfrm>
+            <a:off x="2753557" y="4159771"/>
+            <a:ext cx="2608556" cy="276999"/>
+          </a:xfrm>
+          <a:prstGeom prst="rect">
+            <a:avLst/>
+          </a:prstGeom>
+          <a:noFill/>
+        </p:spPr>
+        <p:txBody>
+          <a:bodyPr wrap="square" rtlCol="0">
+            <a:spAutoFit/>
+          </a:bodyPr>
+          <a:lstStyle/>
+          <a:p>
+            <a:r>
+              <a:rPr lang="en-US" sz="1200" dirty="0"/>
+              <a:t>A class for formatting bibliographies</a:t>
+            </a:r>
+          </a:p>
+        </p:txBody>
+      </p:sp>
+      <p:cxnSp>
+        <p:nvCxnSpPr>
+          <p:cNvPr id="13" name="Straight Arrow Connector 12">
+            <a:extLst>
+              <a:ext uri="{FF2B5EF4-FFF2-40B4-BE49-F238E27FC236}">
+                <a16:creationId xmlns:a16="http://schemas.microsoft.com/office/drawing/2014/main" id="{4182E747-99CB-4B49-871F-F1B2764FD7C2}"/>
+              </a:ext>
+            </a:extLst>
+          </p:cNvPr>
+          <p:cNvCxnSpPr>
+            <a:cxnSpLocks/>
+          </p:cNvCxnSpPr>
+          <p:nvPr/>
+        </p:nvCxnSpPr>
+        <p:spPr>
+          <a:xfrm>
+            <a:off x="2133600" y="2703249"/>
+            <a:ext cx="532660" cy="0"/>
+          </a:xfrm>
+          <a:prstGeom prst="straightConnector1">
+            <a:avLst/>
+          </a:prstGeom>
+          <a:ln>
+            <a:tailEnd type="triangle"/>
+          </a:ln>
+        </p:spPr>
+        <p:style>
+          <a:lnRef idx="1">
+            <a:schemeClr val="accent1"/>
+          </a:lnRef>
+          <a:fillRef idx="0">
+            <a:schemeClr val="accent1"/>
+          </a:fillRef>
+          <a:effectRef idx="0">
+            <a:schemeClr val="accent1"/>
+          </a:effectRef>
+          <a:fontRef idx="minor">
+            <a:schemeClr val="tx1"/>
+          </a:fontRef>
+        </p:style>
+      </p:cxnSp>
+      <p:sp>
+        <p:nvSpPr>
+          <p:cNvPr id="15" name="TextBox 14">
+            <a:extLst>
+              <a:ext uri="{FF2B5EF4-FFF2-40B4-BE49-F238E27FC236}">
+                <a16:creationId xmlns:a16="http://schemas.microsoft.com/office/drawing/2014/main" id="{F151CB22-2CD5-4429-BF0F-C448F4402D4E}"/>
+              </a:ext>
+            </a:extLst>
+          </p:cNvPr>
+          <p:cNvSpPr txBox="1"/>
+          <p:nvPr/>
+        </p:nvSpPr>
+        <p:spPr>
+          <a:xfrm>
+            <a:off x="2666260" y="2564749"/>
+            <a:ext cx="2608556" cy="276999"/>
+          </a:xfrm>
+          <a:prstGeom prst="rect">
+            <a:avLst/>
+          </a:prstGeom>
+          <a:noFill/>
+        </p:spPr>
+        <p:txBody>
+          <a:bodyPr wrap="square" rtlCol="0">
+            <a:spAutoFit/>
+          </a:bodyPr>
+          <a:lstStyle/>
+          <a:p>
+            <a:r>
+              <a:rPr lang="en-US" sz="1200" dirty="0"/>
+              <a:t>An example .bib file</a:t>
+            </a:r>
+          </a:p>
+        </p:txBody>
+      </p:sp>
+      <p:cxnSp>
+        <p:nvCxnSpPr>
+          <p:cNvPr id="17" name="Straight Arrow Connector 16">
+            <a:extLst>
+              <a:ext uri="{FF2B5EF4-FFF2-40B4-BE49-F238E27FC236}">
+                <a16:creationId xmlns:a16="http://schemas.microsoft.com/office/drawing/2014/main" id="{E3DA09BC-AD2B-40F9-862A-EE497BECA9B6}"/>
+              </a:ext>
+            </a:extLst>
+          </p:cNvPr>
+          <p:cNvCxnSpPr>
+            <a:cxnSpLocks/>
+          </p:cNvCxnSpPr>
+          <p:nvPr/>
+        </p:nvCxnSpPr>
+        <p:spPr>
+          <a:xfrm>
+            <a:off x="2294877" y="4492702"/>
+            <a:ext cx="532660" cy="0"/>
+          </a:xfrm>
+          <a:prstGeom prst="straightConnector1">
+            <a:avLst/>
+          </a:prstGeom>
+          <a:ln>
+            <a:tailEnd type="triangle"/>
+          </a:ln>
+        </p:spPr>
+        <p:style>
+          <a:lnRef idx="1">
+            <a:schemeClr val="accent1"/>
+          </a:lnRef>
+          <a:fillRef idx="0">
+            <a:schemeClr val="accent1"/>
+          </a:fillRef>
+          <a:effectRef idx="0">
+            <a:schemeClr val="accent1"/>
+          </a:effectRef>
+          <a:fontRef idx="minor">
+            <a:schemeClr val="tx1"/>
+          </a:fontRef>
+        </p:style>
+      </p:cxnSp>
+      <p:sp>
+        <p:nvSpPr>
+          <p:cNvPr id="19" name="TextBox 18">
+            <a:extLst>
+              <a:ext uri="{FF2B5EF4-FFF2-40B4-BE49-F238E27FC236}">
+                <a16:creationId xmlns:a16="http://schemas.microsoft.com/office/drawing/2014/main" id="{1FA6CF63-9626-4B66-B1E0-865FB9D35A83}"/>
+              </a:ext>
+            </a:extLst>
+          </p:cNvPr>
+          <p:cNvSpPr txBox="1"/>
+          <p:nvPr/>
+        </p:nvSpPr>
+        <p:spPr>
+          <a:xfrm>
+            <a:off x="2827537" y="4354202"/>
+            <a:ext cx="2608556" cy="276999"/>
+          </a:xfrm>
+          <a:prstGeom prst="rect">
+            <a:avLst/>
+          </a:prstGeom>
+          <a:noFill/>
+        </p:spPr>
+        <p:txBody>
+          <a:bodyPr wrap="square" rtlCol="0">
+            <a:spAutoFit/>
+          </a:bodyPr>
+          <a:lstStyle/>
+          <a:p>
+            <a:r>
+              <a:rPr lang="en-US" sz="1200" dirty="0"/>
+              <a:t>What you should have read already!</a:t>
+            </a:r>
+          </a:p>
+        </p:txBody>
+      </p:sp>
     </p:spTree>
     <p:extLst>
       <p:ext uri="{BB962C8B-B14F-4D97-AF65-F5344CB8AC3E}">
@@ -5941,7 +6342,7 @@
         <p:spPr>
           <a:xfrm>
             <a:off x="399495" y="1690688"/>
-            <a:ext cx="11292396" cy="646331"/>
+            <a:ext cx="11292396" cy="923330"/>
           </a:xfrm>
           <a:prstGeom prst="rect">
             <a:avLst/>
@@ -5956,7 +6357,7 @@
           <a:p>
             <a:r>
               <a:rPr lang="en-US" dirty="0"/>
-              <a:t>You don’t need to but here I am using JABREF (</a:t>
+              <a:t>You don’t need to use this software but here I am using JABREF (</a:t>
             </a:r>
             <a:r>
               <a:rPr lang="en-US" dirty="0">
@@ -5967,6 +6368,20 @@
             <a:r>
               <a:rPr lang="en-US" dirty="0"/>
               <a:t>)</a:t>
+            </a:r>
+          </a:p>
+          <a:p>
+            <a:r>
+              <a:rPr lang="en-US" dirty="0"/>
+              <a:t>Don’t need to start a new file, just use the </a:t>
+            </a:r>
+            <a:r>
+              <a:rPr lang="en-US" dirty="0" err="1"/>
+              <a:t>biblio.bib</a:t>
+            </a:r>
+            <a:r>
+              <a:rPr lang="en-US" dirty="0"/>
+              <a:t> provided to begin with</a:t>
             </a:r>
           </a:p>
           <a:p>

</xml_diff>